<commit_message>
Adding PowerPoint version of ingest-overview
</commit_message>
<xml_diff>
--- a/images/ingest-overview_w_i2b2.pptx
+++ b/images/ingest-overview_w_i2b2.pptx
@@ -197,7 +197,7 @@
           <a:p>
             <a:fld id="{2C1B7D21-3593-45D7-B643-6956052FAFB4}" type="datetimeFigureOut">
               <a:rPr lang="en-US" smtClean="0"/>
-              <a:t>1/19/2017</a:t>
+              <a:t>1/20/2017</a:t>
             </a:fld>
             <a:endParaRPr lang="en-US" dirty="0"/>
           </a:p>
@@ -509,6 +509,10 @@
           <a:bodyPr/>
           <a:lstStyle/>
           <a:p>
+            <a:r>
+              <a:rPr lang="en-US" smtClean="0"/>
+              <a:t>w/ i2b2</a:t>
+            </a:r>
             <a:endParaRPr lang="en-US" dirty="0"/>
           </a:p>
         </p:txBody>
@@ -680,7 +684,7 @@
           <a:p>
             <a:fld id="{383D56E3-2C0D-4DFA-88C1-073D47FF3707}" type="datetimeFigureOut">
               <a:rPr lang="en-US" smtClean="0"/>
-              <a:t>1/19/2017</a:t>
+              <a:t>1/20/2017</a:t>
             </a:fld>
             <a:endParaRPr lang="en-US" dirty="0"/>
           </a:p>
@@ -850,7 +854,7 @@
           <a:p>
             <a:fld id="{383D56E3-2C0D-4DFA-88C1-073D47FF3707}" type="datetimeFigureOut">
               <a:rPr lang="en-US" smtClean="0"/>
-              <a:t>1/19/2017</a:t>
+              <a:t>1/20/2017</a:t>
             </a:fld>
             <a:endParaRPr lang="en-US" dirty="0"/>
           </a:p>
@@ -1030,7 +1034,7 @@
           <a:p>
             <a:fld id="{383D56E3-2C0D-4DFA-88C1-073D47FF3707}" type="datetimeFigureOut">
               <a:rPr lang="en-US" smtClean="0"/>
-              <a:t>1/19/2017</a:t>
+              <a:t>1/20/2017</a:t>
             </a:fld>
             <a:endParaRPr lang="en-US" dirty="0"/>
           </a:p>
@@ -1200,7 +1204,7 @@
           <a:p>
             <a:fld id="{383D56E3-2C0D-4DFA-88C1-073D47FF3707}" type="datetimeFigureOut">
               <a:rPr lang="en-US" smtClean="0"/>
-              <a:t>1/19/2017</a:t>
+              <a:t>1/20/2017</a:t>
             </a:fld>
             <a:endParaRPr lang="en-US" dirty="0"/>
           </a:p>
@@ -1446,7 +1450,7 @@
           <a:p>
             <a:fld id="{383D56E3-2C0D-4DFA-88C1-073D47FF3707}" type="datetimeFigureOut">
               <a:rPr lang="en-US" smtClean="0"/>
-              <a:t>1/19/2017</a:t>
+              <a:t>1/20/2017</a:t>
             </a:fld>
             <a:endParaRPr lang="en-US" dirty="0"/>
           </a:p>
@@ -1678,7 +1682,7 @@
           <a:p>
             <a:fld id="{383D56E3-2C0D-4DFA-88C1-073D47FF3707}" type="datetimeFigureOut">
               <a:rPr lang="en-US" smtClean="0"/>
-              <a:t>1/19/2017</a:t>
+              <a:t>1/20/2017</a:t>
             </a:fld>
             <a:endParaRPr lang="en-US" dirty="0"/>
           </a:p>
@@ -2045,7 +2049,7 @@
           <a:p>
             <a:fld id="{383D56E3-2C0D-4DFA-88C1-073D47FF3707}" type="datetimeFigureOut">
               <a:rPr lang="en-US" smtClean="0"/>
-              <a:t>1/19/2017</a:t>
+              <a:t>1/20/2017</a:t>
             </a:fld>
             <a:endParaRPr lang="en-US" dirty="0"/>
           </a:p>
@@ -2163,7 +2167,7 @@
           <a:p>
             <a:fld id="{383D56E3-2C0D-4DFA-88C1-073D47FF3707}" type="datetimeFigureOut">
               <a:rPr lang="en-US" smtClean="0"/>
-              <a:t>1/19/2017</a:t>
+              <a:t>1/20/2017</a:t>
             </a:fld>
             <a:endParaRPr lang="en-US" dirty="0"/>
           </a:p>
@@ -2258,7 +2262,7 @@
           <a:p>
             <a:fld id="{383D56E3-2C0D-4DFA-88C1-073D47FF3707}" type="datetimeFigureOut">
               <a:rPr lang="en-US" smtClean="0"/>
-              <a:t>1/19/2017</a:t>
+              <a:t>1/20/2017</a:t>
             </a:fld>
             <a:endParaRPr lang="en-US" dirty="0"/>
           </a:p>
@@ -2535,7 +2539,7 @@
           <a:p>
             <a:fld id="{383D56E3-2C0D-4DFA-88C1-073D47FF3707}" type="datetimeFigureOut">
               <a:rPr lang="en-US" smtClean="0"/>
-              <a:t>1/19/2017</a:t>
+              <a:t>1/20/2017</a:t>
             </a:fld>
             <a:endParaRPr lang="en-US" dirty="0"/>
           </a:p>
@@ -2788,7 +2792,7 @@
           <a:p>
             <a:fld id="{383D56E3-2C0D-4DFA-88C1-073D47FF3707}" type="datetimeFigureOut">
               <a:rPr lang="en-US" smtClean="0"/>
-              <a:t>1/19/2017</a:t>
+              <a:t>1/20/2017</a:t>
             </a:fld>
             <a:endParaRPr lang="en-US" dirty="0"/>
           </a:p>
@@ -3001,7 +3005,7 @@
           <a:p>
             <a:fld id="{383D56E3-2C0D-4DFA-88C1-073D47FF3707}" type="datetimeFigureOut">
               <a:rPr lang="en-US" smtClean="0"/>
-              <a:t>1/19/2017</a:t>
+              <a:t>1/20/2017</a:t>
             </a:fld>
             <a:endParaRPr lang="en-US" dirty="0"/>
           </a:p>
@@ -4801,7 +4805,6 @@
               <a:rPr lang="en-US" dirty="0"/>
               <a:t>Ingest</a:t>
             </a:r>
-            <a:endParaRPr lang="en-US" dirty="0"/>
           </a:p>
         </p:txBody>
       </p:sp>
@@ -4840,7 +4843,6 @@
               <a:rPr lang="en-US" dirty="0"/>
               <a:t>Data Store</a:t>
             </a:r>
-            <a:endParaRPr lang="en-US" dirty="0"/>
           </a:p>
         </p:txBody>
       </p:sp>
@@ -4879,7 +4881,6 @@
               <a:rPr lang="en-US" dirty="0"/>
               <a:t>Services</a:t>
             </a:r>
-            <a:endParaRPr lang="en-US" dirty="0"/>
           </a:p>
         </p:txBody>
       </p:sp>

</xml_diff>